<commit_message>
direktive i REST pozivi
</commit_message>
<xml_diff>
--- a/AngularJS/01_Kontroleri/AngularJS_02_kontroleri.pptx
+++ b/AngularJS/01_Kontroleri/AngularJS_02_kontroleri.pptx
@@ -319,7 +319,7 @@
           <a:p>
             <a:fld id="{2986D4BE-532F-443B-99AA-016C229502D5}" type="datetimeFigureOut">
               <a:rPr lang="en-GB" smtClean="0"/>
-              <a:t>14/11/2016</a:t>
+              <a:t>15/11/2016</a:t>
             </a:fld>
             <a:endParaRPr lang="en-GB"/>
           </a:p>
@@ -489,7 +489,7 @@
           <a:p>
             <a:fld id="{2986D4BE-532F-443B-99AA-016C229502D5}" type="datetimeFigureOut">
               <a:rPr lang="en-GB" smtClean="0"/>
-              <a:t>14/11/2016</a:t>
+              <a:t>15/11/2016</a:t>
             </a:fld>
             <a:endParaRPr lang="en-GB"/>
           </a:p>
@@ -669,7 +669,7 @@
           <a:p>
             <a:fld id="{2986D4BE-532F-443B-99AA-016C229502D5}" type="datetimeFigureOut">
               <a:rPr lang="en-GB" smtClean="0"/>
-              <a:t>14/11/2016</a:t>
+              <a:t>15/11/2016</a:t>
             </a:fld>
             <a:endParaRPr lang="en-GB"/>
           </a:p>
@@ -839,7 +839,7 @@
           <a:p>
             <a:fld id="{2986D4BE-532F-443B-99AA-016C229502D5}" type="datetimeFigureOut">
               <a:rPr lang="en-GB" smtClean="0"/>
-              <a:t>14/11/2016</a:t>
+              <a:t>15/11/2016</a:t>
             </a:fld>
             <a:endParaRPr lang="en-GB"/>
           </a:p>
@@ -1085,7 +1085,7 @@
           <a:p>
             <a:fld id="{2986D4BE-532F-443B-99AA-016C229502D5}" type="datetimeFigureOut">
               <a:rPr lang="en-GB" smtClean="0"/>
-              <a:t>14/11/2016</a:t>
+              <a:t>15/11/2016</a:t>
             </a:fld>
             <a:endParaRPr lang="en-GB"/>
           </a:p>
@@ -1373,7 +1373,7 @@
           <a:p>
             <a:fld id="{2986D4BE-532F-443B-99AA-016C229502D5}" type="datetimeFigureOut">
               <a:rPr lang="en-GB" smtClean="0"/>
-              <a:t>14/11/2016</a:t>
+              <a:t>15/11/2016</a:t>
             </a:fld>
             <a:endParaRPr lang="en-GB"/>
           </a:p>
@@ -1795,7 +1795,7 @@
           <a:p>
             <a:fld id="{2986D4BE-532F-443B-99AA-016C229502D5}" type="datetimeFigureOut">
               <a:rPr lang="en-GB" smtClean="0"/>
-              <a:t>14/11/2016</a:t>
+              <a:t>15/11/2016</a:t>
             </a:fld>
             <a:endParaRPr lang="en-GB"/>
           </a:p>
@@ -1913,7 +1913,7 @@
           <a:p>
             <a:fld id="{2986D4BE-532F-443B-99AA-016C229502D5}" type="datetimeFigureOut">
               <a:rPr lang="en-GB" smtClean="0"/>
-              <a:t>14/11/2016</a:t>
+              <a:t>15/11/2016</a:t>
             </a:fld>
             <a:endParaRPr lang="en-GB"/>
           </a:p>
@@ -2008,7 +2008,7 @@
           <a:p>
             <a:fld id="{2986D4BE-532F-443B-99AA-016C229502D5}" type="datetimeFigureOut">
               <a:rPr lang="en-GB" smtClean="0"/>
-              <a:t>14/11/2016</a:t>
+              <a:t>15/11/2016</a:t>
             </a:fld>
             <a:endParaRPr lang="en-GB"/>
           </a:p>
@@ -2285,7 +2285,7 @@
           <a:p>
             <a:fld id="{2986D4BE-532F-443B-99AA-016C229502D5}" type="datetimeFigureOut">
               <a:rPr lang="en-GB" smtClean="0"/>
-              <a:t>14/11/2016</a:t>
+              <a:t>15/11/2016</a:t>
             </a:fld>
             <a:endParaRPr lang="en-GB"/>
           </a:p>
@@ -2538,7 +2538,7 @@
           <a:p>
             <a:fld id="{2986D4BE-532F-443B-99AA-016C229502D5}" type="datetimeFigureOut">
               <a:rPr lang="en-GB" smtClean="0"/>
-              <a:t>14/11/2016</a:t>
+              <a:t>15/11/2016</a:t>
             </a:fld>
             <a:endParaRPr lang="en-GB"/>
           </a:p>
@@ -2751,7 +2751,7 @@
           <a:p>
             <a:fld id="{2986D4BE-532F-443B-99AA-016C229502D5}" type="datetimeFigureOut">
               <a:rPr lang="en-GB" smtClean="0"/>
-              <a:t>14/11/2016</a:t>
+              <a:t>15/11/2016</a:t>
             </a:fld>
             <a:endParaRPr lang="en-GB"/>
           </a:p>
@@ -12414,8 +12414,24 @@
           <a:p>
             <a:pPr lvl="1"/>
             <a:r>
-              <a:rPr lang="sr-Latn-RS" dirty="0" smtClean="0"/>
-              <a:t>Elemente bogatog korisničkog interfejsa</a:t>
+              <a:rPr lang="en-GB" dirty="0" smtClean="0"/>
+              <a:t>AJAX </a:t>
+            </a:r>
+            <a:r>
+              <a:rPr lang="en-GB" dirty="0" err="1" smtClean="0"/>
+              <a:t>pozivi</a:t>
+            </a:r>
+            <a:endParaRPr lang="en-GB" dirty="0" smtClean="0"/>
+          </a:p>
+          <a:p>
+            <a:pPr lvl="1"/>
+            <a:r>
+              <a:rPr lang="sr-Latn-RS" dirty="0" smtClean="0"/>
+              <a:t>Elemente </a:t>
+            </a:r>
+            <a:r>
+              <a:rPr lang="sr-Latn-RS" dirty="0" smtClean="0"/>
+              <a:t>bogatog korisničkog interfejsa</a:t>
             </a:r>
           </a:p>
           <a:p>

</xml_diff>